<commit_message>
added more info on aif
</commit_message>
<xml_diff>
--- a/AndriiKliachkin.pptx
+++ b/AndriiKliachkin.pptx
@@ -110,6 +110,17 @@
     </a:lvl9pPr>
   </p:defaultTextStyle>
   <p:extLst>
+    <p:ext uri="{521415D9-36F7-43E2-AB2F-B90AF26B5E84}">
+      <p14:sectionLst xmlns:p14="http://schemas.microsoft.com/office/powerpoint/2010/main">
+        <p14:section name="Default Section" id="{24FC73C0-3B65-43BD-8545-145D8D8A3256}">
+          <p14:sldIdLst>
+            <p14:sldId id="276"/>
+            <p14:sldId id="277"/>
+            <p14:sldId id="278"/>
+          </p14:sldIdLst>
+        </p14:section>
+      </p14:sectionLst>
+    </p:ext>
     <p:ext uri="{EFAFB233-063F-42B5-8137-9DF3F51BA10A}">
       <p15:sldGuideLst xmlns:p15="http://schemas.microsoft.com/office/powerpoint/2012/main"/>
     </p:ext>
@@ -4186,8 +4197,8 @@
         </p:nvSpPr>
         <p:spPr>
           <a:xfrm>
-            <a:off x="753899" y="1295163"/>
-            <a:ext cx="3895810" cy="369332"/>
+            <a:off x="753900" y="1295163"/>
+            <a:ext cx="7983548" cy="3416320"/>
           </a:xfrm>
           <a:prstGeom prst="rect">
             <a:avLst/>
@@ -4195,14 +4206,155 @@
           <a:noFill/>
         </p:spPr>
         <p:txBody>
-          <a:bodyPr wrap="none" rtlCol="0">
+          <a:bodyPr wrap="square" rtlCol="0">
             <a:spAutoFit/>
           </a:bodyPr>
           <a:lstStyle/>
           <a:p>
+            <a:pPr marL="285750" indent="-285750">
+              <a:buFont typeface="Arial" panose="020B0604020202020204" pitchFamily="34" charset="0"/>
+              <a:buChar char="•"/>
+            </a:pPr>
             <a:r>
               <a:rPr lang="en-GB" dirty="0"/>
-              <a:t>Machine learning models are impacting</a:t>
+              <a:t>Machine learning (ML) models are used more and more in areas that impact human lives in a significant way – from university admissions to refugee </a:t>
+            </a:r>
+            <a:r>
+              <a:rPr lang="en-GB"/>
+              <a:t>asylum decisions</a:t>
+            </a:r>
+            <a:r>
+              <a:rPr lang="en-GB" baseline="30000"/>
+              <a:t>1,2</a:t>
+            </a:r>
+            <a:r>
+              <a:rPr lang="en-GB" dirty="0"/>
+              <a:t>;</a:t>
+            </a:r>
+          </a:p>
+          <a:p>
+            <a:endParaRPr lang="en-GB" dirty="0"/>
+          </a:p>
+          <a:p>
+            <a:pPr marL="285750" indent="-285750">
+              <a:buFont typeface="Arial" panose="020B0604020202020204" pitchFamily="34" charset="0"/>
+              <a:buChar char="•"/>
+            </a:pPr>
+            <a:r>
+              <a:rPr lang="en-GB" dirty="0"/>
+              <a:t>ML models learn from real-world data that may mirror real-world inequalities;</a:t>
+            </a:r>
+          </a:p>
+          <a:p>
+            <a:pPr marL="285750" indent="-285750">
+              <a:buFont typeface="Arial" panose="020B0604020202020204" pitchFamily="34" charset="0"/>
+              <a:buChar char="•"/>
+            </a:pPr>
+            <a:endParaRPr lang="en-GB" dirty="0"/>
+          </a:p>
+          <a:p>
+            <a:pPr marL="285750" indent="-285750">
+              <a:buFont typeface="Arial" panose="020B0604020202020204" pitchFamily="34" charset="0"/>
+              <a:buChar char="•"/>
+            </a:pPr>
+            <a:r>
+              <a:rPr lang="en-GB" dirty="0"/>
+              <a:t>ML models may also be flawed due to their design, bad data, or bad training process;</a:t>
+            </a:r>
+          </a:p>
+          <a:p>
+            <a:pPr marL="285750" indent="-285750">
+              <a:buFont typeface="Arial" panose="020B0604020202020204" pitchFamily="34" charset="0"/>
+              <a:buChar char="•"/>
+            </a:pPr>
+            <a:endParaRPr lang="en-GB" dirty="0"/>
+          </a:p>
+          <a:p>
+            <a:pPr marL="285750" indent="-285750">
+              <a:buFont typeface="Arial" panose="020B0604020202020204" pitchFamily="34" charset="0"/>
+              <a:buChar char="•"/>
+            </a:pPr>
+            <a:r>
+              <a:rPr lang="en-GB" dirty="0"/>
+              <a:t>As such, decisions produced by ML models may – and in many cases, have been shown to – be biased against some groups of the population.</a:t>
+            </a:r>
+          </a:p>
+          <a:p>
+            <a:endParaRPr lang="en-GB" dirty="0"/>
+          </a:p>
+        </p:txBody>
+      </p:sp>
+      <p:sp>
+        <p:nvSpPr>
+          <p:cNvPr id="2" name="TextBox 1">
+            <a:extLst>
+              <a:ext uri="{FF2B5EF4-FFF2-40B4-BE49-F238E27FC236}">
+                <a16:creationId xmlns:a16="http://schemas.microsoft.com/office/drawing/2014/main" id="{AF7E9FBE-2567-734A-7C58-971B38A89658}"/>
+              </a:ext>
+            </a:extLst>
+          </p:cNvPr>
+          <p:cNvSpPr txBox="1"/>
+          <p:nvPr/>
+        </p:nvSpPr>
+        <p:spPr>
+          <a:xfrm>
+            <a:off x="404557" y="5331099"/>
+            <a:ext cx="8326900" cy="1015663"/>
+          </a:xfrm>
+          <a:prstGeom prst="rect">
+            <a:avLst/>
+          </a:prstGeom>
+          <a:noFill/>
+        </p:spPr>
+        <p:txBody>
+          <a:bodyPr wrap="square" rtlCol="0">
+            <a:spAutoFit/>
+          </a:bodyPr>
+          <a:lstStyle/>
+          <a:p>
+            <a:r>
+              <a:rPr lang="en-GB" sz="1200" dirty="0"/>
+              <a:t>[1]</a:t>
+            </a:r>
+            <a:r>
+              <a:rPr lang="en-GB" sz="1200" dirty="0">
+                <a:effectLst/>
+              </a:rPr>
+              <a:t> </a:t>
+            </a:r>
+            <a:r>
+              <a:rPr lang="en-GB" sz="1200" dirty="0" err="1"/>
+              <a:t>Jasmontaite-Zaniewicz</a:t>
+            </a:r>
+            <a:r>
+              <a:rPr lang="en-GB" sz="1200" dirty="0"/>
+              <a:t>, L., &amp; </a:t>
+            </a:r>
+            <a:r>
+              <a:rPr lang="en-GB" sz="1200" dirty="0" err="1"/>
+              <a:t>Zomignani</a:t>
+            </a:r>
+            <a:r>
+              <a:rPr lang="en-GB" sz="1200" dirty="0"/>
+              <a:t> Barboza, J. (2021). Disproportionate Surveillance: Technology-Assisted and Automated Decisions in Asylum Applications in the EU?</a:t>
+            </a:r>
+            <a:r>
+              <a:rPr lang="en-GB" sz="1200" i="1" dirty="0"/>
+              <a:t>. International Journal of Refugee Law, 33(1), 89-110.</a:t>
+            </a:r>
+          </a:p>
+          <a:p>
+            <a:r>
+              <a:rPr lang="en-GB" sz="1200" dirty="0"/>
+              <a:t>[2] N. Y. T. Meredith Broussard, “When algorithms give real students imaginary grades,” https : / / web . archive . org / web / 20240223090531 / https : / / www . </a:t>
+            </a:r>
+            <a:r>
+              <a:rPr lang="en-GB" sz="1200" dirty="0" err="1"/>
+              <a:t>nytimes</a:t>
+            </a:r>
+            <a:r>
+              <a:rPr lang="en-GB" sz="1200" dirty="0"/>
+              <a:t> . com /2020/09/08/opinion/international-baccalaureate-algorithm-grades.html, [Online; Accessed: 2024-25-03]</a:t>
             </a:r>
           </a:p>
         </p:txBody>

</xml_diff>